<commit_message>
docs: update icon and readme
</commit_message>
<xml_diff>
--- a/Assets/shortcut.pptx
+++ b/Assets/shortcut.pptx
@@ -3081,7 +3081,7 @@
       </p:grpSpPr>
       <p:pic>
         <p:nvPicPr>
-          <p:cNvPr id="4" name="图片 3"/>
+          <p:cNvPr id="28" name="图片 27"/>
           <p:cNvPicPr>
             <a:picLocks noChangeAspect="1"/>
           </p:cNvPicPr>
@@ -3095,8 +3095,8 @@
         </p:blipFill>
         <p:spPr>
           <a:xfrm>
-            <a:off x="2100580" y="2545080"/>
-            <a:ext cx="1165860" cy="640080"/>
+            <a:off x="4301490" y="1661160"/>
+            <a:ext cx="922020" cy="640080"/>
           </a:xfrm>
           <a:prstGeom prst="rect">
             <a:avLst/>
@@ -3105,7 +3105,7 @@
       </p:pic>
       <p:pic>
         <p:nvPicPr>
-          <p:cNvPr id="5" name="图片 4"/>
+          <p:cNvPr id="27" name="图片 26"/>
           <p:cNvPicPr>
             <a:picLocks noChangeAspect="1"/>
           </p:cNvPicPr>
@@ -3119,8 +3119,8 @@
         </p:blipFill>
         <p:spPr>
           <a:xfrm>
-            <a:off x="5363845" y="754380"/>
-            <a:ext cx="929640" cy="640080"/>
+            <a:off x="3201035" y="1653540"/>
+            <a:ext cx="922020" cy="640080"/>
           </a:xfrm>
           <a:prstGeom prst="rect">
             <a:avLst/>
@@ -3129,7 +3129,7 @@
       </p:pic>
       <p:pic>
         <p:nvPicPr>
-          <p:cNvPr id="6" name="图片 5"/>
+          <p:cNvPr id="26" name="图片 25"/>
           <p:cNvPicPr>
             <a:picLocks noChangeAspect="1"/>
           </p:cNvPicPr>
@@ -3143,8 +3143,8 @@
         </p:blipFill>
         <p:spPr>
           <a:xfrm>
-            <a:off x="2100580" y="754380"/>
-            <a:ext cx="662940" cy="640080"/>
+            <a:off x="2100580" y="1668780"/>
+            <a:ext cx="922020" cy="640080"/>
           </a:xfrm>
           <a:prstGeom prst="rect">
             <a:avLst/>
@@ -3153,7 +3153,7 @@
       </p:pic>
       <p:pic>
         <p:nvPicPr>
-          <p:cNvPr id="7" name="图片 6"/>
+          <p:cNvPr id="24" name="图片 23"/>
           <p:cNvPicPr>
             <a:picLocks noChangeAspect="1"/>
           </p:cNvPicPr>
@@ -3167,8 +3167,8 @@
         </p:blipFill>
         <p:spPr>
           <a:xfrm>
-            <a:off x="2690495" y="754380"/>
-            <a:ext cx="662940" cy="640080"/>
+            <a:off x="3537585" y="2553970"/>
+            <a:ext cx="876300" cy="640080"/>
           </a:xfrm>
           <a:prstGeom prst="rect">
             <a:avLst/>
@@ -3177,7 +3177,7 @@
       </p:pic>
       <p:pic>
         <p:nvPicPr>
-          <p:cNvPr id="8" name="图片 7"/>
+          <p:cNvPr id="23" name="图片 22"/>
           <p:cNvPicPr>
             <a:picLocks noChangeAspect="1"/>
           </p:cNvPicPr>
@@ -3191,8 +3191,8 @@
         </p:blipFill>
         <p:spPr>
           <a:xfrm>
-            <a:off x="2100580" y="1660525"/>
-            <a:ext cx="922020" cy="640080"/>
+            <a:off x="2100580" y="2552700"/>
+            <a:ext cx="1143000" cy="640080"/>
           </a:xfrm>
           <a:prstGeom prst="rect">
             <a:avLst/>
@@ -3201,7 +3201,7 @@
       </p:pic>
       <p:pic>
         <p:nvPicPr>
-          <p:cNvPr id="9" name="图片 8"/>
+          <p:cNvPr id="22" name="图片 21"/>
           <p:cNvPicPr>
             <a:picLocks noChangeAspect="1"/>
           </p:cNvPicPr>
@@ -3215,7 +3215,7 @@
         </p:blipFill>
         <p:spPr>
           <a:xfrm>
-            <a:off x="3201035" y="1660525"/>
+            <a:off x="5401945" y="1661160"/>
             <a:ext cx="922020" cy="640080"/>
           </a:xfrm>
           <a:prstGeom prst="rect">
@@ -3225,7 +3225,7 @@
       </p:pic>
       <p:pic>
         <p:nvPicPr>
-          <p:cNvPr id="10" name="图片 9"/>
+          <p:cNvPr id="18" name="图片 17"/>
           <p:cNvPicPr>
             <a:picLocks noChangeAspect="1"/>
           </p:cNvPicPr>
@@ -3239,8 +3239,8 @@
         </p:blipFill>
         <p:spPr>
           <a:xfrm>
-            <a:off x="3537585" y="2545080"/>
-            <a:ext cx="899160" cy="640080"/>
+            <a:off x="5375910" y="768350"/>
+            <a:ext cx="922020" cy="640080"/>
           </a:xfrm>
           <a:prstGeom prst="rect">
             <a:avLst/>
@@ -3249,7 +3249,7 @@
       </p:pic>
       <p:pic>
         <p:nvPicPr>
-          <p:cNvPr id="11" name="图片 10"/>
+          <p:cNvPr id="17" name="图片 16"/>
           <p:cNvPicPr>
             <a:picLocks noChangeAspect="1"/>
           </p:cNvPicPr>
@@ -3263,8 +3263,8 @@
         </p:blipFill>
         <p:spPr>
           <a:xfrm>
-            <a:off x="4202430" y="754380"/>
-            <a:ext cx="929640" cy="640080"/>
+            <a:off x="4202430" y="768350"/>
+            <a:ext cx="922020" cy="640080"/>
           </a:xfrm>
           <a:prstGeom prst="rect">
             <a:avLst/>
@@ -3273,7 +3273,7 @@
       </p:pic>
       <p:pic>
         <p:nvPicPr>
-          <p:cNvPr id="12" name="图片 11"/>
+          <p:cNvPr id="3" name="图片 2"/>
           <p:cNvPicPr>
             <a:picLocks noChangeAspect="1"/>
           </p:cNvPicPr>
@@ -3287,8 +3287,8 @@
         </p:blipFill>
         <p:spPr>
           <a:xfrm>
-            <a:off x="2093595" y="3429000"/>
-            <a:ext cx="3421380" cy="1463040"/>
+            <a:off x="2100580" y="746760"/>
+            <a:ext cx="655320" cy="640080"/>
           </a:xfrm>
           <a:prstGeom prst="rect">
             <a:avLst/>
@@ -3297,7 +3297,7 @@
       </p:pic>
       <p:pic>
         <p:nvPicPr>
-          <p:cNvPr id="14" name="图片 13"/>
+          <p:cNvPr id="2" name="图片 1"/>
           <p:cNvPicPr>
             <a:picLocks noChangeAspect="1"/>
           </p:cNvPicPr>
@@ -3311,8 +3311,8 @@
         </p:blipFill>
         <p:spPr>
           <a:xfrm>
-            <a:off x="5401945" y="1660525"/>
-            <a:ext cx="891540" cy="640080"/>
+            <a:off x="2698115" y="746760"/>
+            <a:ext cx="655320" cy="640080"/>
           </a:xfrm>
           <a:prstGeom prst="rect">
             <a:avLst/>
@@ -3345,7 +3345,7 @@
       </p:pic>
       <p:pic>
         <p:nvPicPr>
-          <p:cNvPr id="16" name="图片 15"/>
+          <p:cNvPr id="13" name="图片 12"/>
           <p:cNvPicPr>
             <a:picLocks noChangeAspect="1"/>
           </p:cNvPicPr>
@@ -3359,8 +3359,8 @@
         </p:blipFill>
         <p:spPr>
           <a:xfrm>
-            <a:off x="4301490" y="1660525"/>
-            <a:ext cx="883920" cy="640080"/>
+            <a:off x="3353435" y="746760"/>
+            <a:ext cx="647700" cy="640080"/>
           </a:xfrm>
           <a:prstGeom prst="rect">
             <a:avLst/>

</xml_diff>